<commit_message>
added programmer ryan gossling
</commit_message>
<xml_diff>
--- a/slides/scusaConf2013_concurrent.pptx
+++ b/slides/scusaConf2013_concurrent.pptx
@@ -5,7 +5,7 @@
     <p:sldMasterId id="2147483648" r:id="rId1"/>
   </p:sldMasterIdLst>
   <p:notesMasterIdLst>
-    <p:notesMasterId r:id="rId14"/>
+    <p:notesMasterId r:id="rId15"/>
   </p:notesMasterIdLst>
   <p:sldIdLst>
     <p:sldId id="256" r:id="rId2"/>
@@ -17,9 +17,10 @@
     <p:sldId id="262" r:id="rId8"/>
     <p:sldId id="263" r:id="rId9"/>
     <p:sldId id="264" r:id="rId10"/>
-    <p:sldId id="265" r:id="rId11"/>
-    <p:sldId id="266" r:id="rId12"/>
-    <p:sldId id="260" r:id="rId13"/>
+    <p:sldId id="270" r:id="rId11"/>
+    <p:sldId id="265" r:id="rId12"/>
+    <p:sldId id="266" r:id="rId13"/>
+    <p:sldId id="260" r:id="rId14"/>
   </p:sldIdLst>
   <p:sldSz cx="9144000" cy="6858000" type="letter"/>
   <p:notesSz cx="6858000" cy="9144000"/>
@@ -2840,125 +2841,41 @@
           <a:p>
             <a:r>
               <a:rPr lang="en-US" dirty="0" smtClean="0"/>
-              <a:t>Demo #2: Who moved my cheese?</a:t>
+              <a:t>I just thought this was hilarious and had to add it.</a:t>
             </a:r>
             <a:endParaRPr lang="en-US" dirty="0"/>
           </a:p>
         </p:txBody>
       </p:sp>
-      <p:sp>
-        <p:nvSpPr>
-          <p:cNvPr id="3" name="Content Placeholder 2"/>
-          <p:cNvSpPr>
-            <a:spLocks noGrp="1"/>
-          </p:cNvSpPr>
+      <p:pic>
+        <p:nvPicPr>
+          <p:cNvPr id="5" name="Content Placeholder 4"/>
+          <p:cNvPicPr>
+            <a:picLocks noGrp="1" noChangeAspect="1"/>
+          </p:cNvPicPr>
           <p:nvPr>
             <p:ph idx="1"/>
           </p:nvPr>
-        </p:nvSpPr>
-        <p:spPr/>
-        <p:txBody>
-          <a:bodyPr/>
-          <a:lstStyle/>
-          <a:p>
-            <a:endParaRPr lang="en-US" dirty="0" smtClean="0"/>
-          </a:p>
-          <a:p>
-            <a:r>
-              <a:rPr lang="en-US" dirty="0" smtClean="0"/>
-              <a:t>This demo illustrates some basic concurrency problems and how to mitigate them.</a:t>
-            </a:r>
-          </a:p>
-          <a:p>
-            <a:endParaRPr lang="en-US" dirty="0"/>
-          </a:p>
-          <a:p>
-            <a:r>
-              <a:rPr lang="en-US" dirty="0" smtClean="0"/>
-              <a:t>Synchronization primitives:</a:t>
-            </a:r>
-          </a:p>
-          <a:p>
-            <a:pPr lvl="1"/>
-            <a:r>
-              <a:rPr lang="en-US" dirty="0" smtClean="0"/>
-              <a:t>Locks (</a:t>
-            </a:r>
-            <a:r>
-              <a:rPr lang="en-US" dirty="0" err="1" smtClean="0"/>
-              <a:t>Mutex</a:t>
-            </a:r>
-            <a:r>
-              <a:rPr lang="en-US" dirty="0" smtClean="0"/>
-              <a:t>) – </a:t>
-            </a:r>
-            <a:r>
-              <a:rPr lang="en-US" b="1" dirty="0" smtClean="0"/>
-              <a:t>Mut</a:t>
-            </a:r>
-            <a:r>
-              <a:rPr lang="en-US" dirty="0" smtClean="0"/>
-              <a:t>ual </a:t>
-            </a:r>
-            <a:r>
-              <a:rPr lang="en-US" b="1" dirty="0" smtClean="0"/>
-              <a:t>Ex</a:t>
-            </a:r>
-            <a:r>
-              <a:rPr lang="en-US" dirty="0" smtClean="0"/>
-              <a:t>clusion primitive. Only one thread can own the block at any one time.</a:t>
-            </a:r>
-            <a:endParaRPr lang="en-US" b="1" dirty="0" smtClean="0"/>
-          </a:p>
-          <a:p>
-            <a:pPr lvl="1"/>
-            <a:r>
-              <a:rPr lang="en-US" dirty="0" err="1" smtClean="0"/>
-              <a:t>ReaderWriterLockSlim</a:t>
-            </a:r>
-            <a:r>
-              <a:rPr lang="en-US" dirty="0" smtClean="0"/>
-              <a:t> – Different locking levels based on intent. Readers won’t block other readers, but writers will block both readers and other writers.</a:t>
-            </a:r>
-          </a:p>
-          <a:p>
-            <a:pPr lvl="1"/>
-            <a:r>
-              <a:rPr lang="en-US" dirty="0" err="1" smtClean="0"/>
-              <a:t>SemaphoreSlim</a:t>
-            </a:r>
-            <a:r>
-              <a:rPr lang="en-US" dirty="0" smtClean="0"/>
-              <a:t> – Restricts the number of concurrent </a:t>
-            </a:r>
-          </a:p>
-          <a:p>
-            <a:pPr lvl="1"/>
-            <a:r>
-              <a:rPr lang="en-US" dirty="0" err="1" smtClean="0"/>
-              <a:t>SpinWait</a:t>
-            </a:r>
-            <a:r>
-              <a:rPr lang="en-US" dirty="0" smtClean="0"/>
-              <a:t> – Busy-wait instead of yielding a processor time-slice to another thread.</a:t>
-            </a:r>
-          </a:p>
-          <a:p>
-            <a:pPr lvl="1"/>
-            <a:endParaRPr lang="en-US" dirty="0" smtClean="0"/>
-          </a:p>
-          <a:p>
-            <a:r>
-              <a:rPr lang="en-US" dirty="0" smtClean="0"/>
-              <a:t>There are lots more, but these are the most common.</a:t>
-            </a:r>
-          </a:p>
-          <a:p>
-            <a:pPr lvl="1"/>
-            <a:endParaRPr lang="en-US" dirty="0" smtClean="0"/>
-          </a:p>
-        </p:txBody>
-      </p:sp>
+        </p:nvPicPr>
+        <p:blipFill>
+          <a:blip r:embed="rId2">
+            <a:extLst>
+              <a:ext uri="{28A0092B-C50C-407E-A947-70E740481C1C}">
+                <a14:useLocalDpi xmlns:a14="http://schemas.microsoft.com/office/drawing/2010/main" val="0"/>
+              </a:ext>
+            </a:extLst>
+          </a:blip>
+          <a:stretch>
+            <a:fillRect/>
+          </a:stretch>
+        </p:blipFill>
+        <p:spPr>
+          <a:xfrm>
+            <a:off x="2555045" y="628650"/>
+            <a:ext cx="4262510" cy="5772150"/>
+          </a:xfrm>
+        </p:spPr>
+      </p:pic>
       <p:sp>
         <p:nvSpPr>
           <p:cNvPr id="4" name="Slide Number Placeholder 3"/>
@@ -2986,7 +2903,7 @@
     </p:spTree>
     <p:extLst>
       <p:ext uri="{BB962C8B-B14F-4D97-AF65-F5344CB8AC3E}">
-        <p14:creationId xmlns:p14="http://schemas.microsoft.com/office/powerpoint/2010/main" val="1343707259"/>
+        <p14:creationId xmlns:p14="http://schemas.microsoft.com/office/powerpoint/2010/main" val="3460829261"/>
       </p:ext>
     </p:extLst>
   </p:cSld>
@@ -3037,7 +2954,7 @@
           <a:p>
             <a:r>
               <a:rPr lang="en-US" dirty="0" smtClean="0"/>
-              <a:t>Demo #3: SPEEEEEEEED</a:t>
+              <a:t>Demo #2: Who moved my cheese?</a:t>
             </a:r>
             <a:endParaRPr lang="en-US" dirty="0"/>
           </a:p>
@@ -3061,30 +2978,98 @@
             <a:endParaRPr lang="en-US" dirty="0" smtClean="0"/>
           </a:p>
           <a:p>
+            <a:r>
+              <a:rPr lang="en-US" dirty="0" smtClean="0"/>
+              <a:t>This demo illustrates some basic concurrency problems and how to mitigate them.</a:t>
+            </a:r>
+          </a:p>
+          <a:p>
             <a:endParaRPr lang="en-US" dirty="0"/>
           </a:p>
           <a:p>
             <a:r>
               <a:rPr lang="en-US" dirty="0" smtClean="0"/>
-              <a:t>Hopefully this demo doesn’t break. I threw it together in two days and I may have been trying to hit the </a:t>
-            </a:r>
+              <a:t>Synchronization primitives:</a:t>
+            </a:r>
+          </a:p>
+          <a:p>
+            <a:pPr lvl="1"/>
             <a:r>
               <a:rPr lang="en-US" dirty="0" smtClean="0"/>
-              <a:t>B</a:t>
+              <a:t>Locks (</a:t>
+            </a:r>
+            <a:r>
+              <a:rPr lang="en-US" dirty="0" err="1" smtClean="0"/>
+              <a:t>Mutex</a:t>
             </a:r>
             <a:r>
               <a:rPr lang="en-US" dirty="0" smtClean="0"/>
-              <a:t>allmer peak during most of it.</a:t>
-            </a:r>
-          </a:p>
-          <a:p>
-            <a:endParaRPr lang="en-US" dirty="0"/>
-          </a:p>
-          <a:p>
+              <a:t>) – </a:t>
+            </a:r>
+            <a:r>
+              <a:rPr lang="en-US" b="1" dirty="0" smtClean="0"/>
+              <a:t>Mut</a:t>
+            </a:r>
+            <a:r>
+              <a:rPr lang="en-US" dirty="0" smtClean="0"/>
+              <a:t>ual </a:t>
+            </a:r>
+            <a:r>
+              <a:rPr lang="en-US" b="1" dirty="0" smtClean="0"/>
+              <a:t>Ex</a:t>
+            </a:r>
+            <a:r>
+              <a:rPr lang="en-US" dirty="0" smtClean="0"/>
+              <a:t>clusion primitive. Only one thread can own the block at any one time.</a:t>
+            </a:r>
+            <a:endParaRPr lang="en-US" b="1" dirty="0" smtClean="0"/>
+          </a:p>
+          <a:p>
+            <a:pPr lvl="1"/>
+            <a:r>
+              <a:rPr lang="en-US" dirty="0" err="1" smtClean="0"/>
+              <a:t>ReaderWriterLockSlim</a:t>
+            </a:r>
+            <a:r>
+              <a:rPr lang="en-US" dirty="0" smtClean="0"/>
+              <a:t> – Different locking levels based on intent. Readers won’t block other readers, but writers will block both readers and other writers.</a:t>
+            </a:r>
+          </a:p>
+          <a:p>
+            <a:pPr lvl="1"/>
+            <a:r>
+              <a:rPr lang="en-US" dirty="0" err="1" smtClean="0"/>
+              <a:t>SemaphoreSlim</a:t>
+            </a:r>
+            <a:r>
+              <a:rPr lang="en-US" dirty="0" smtClean="0"/>
+              <a:t> – Restricts the number of concurrent </a:t>
+            </a:r>
+          </a:p>
+          <a:p>
+            <a:pPr lvl="1"/>
+            <a:r>
+              <a:rPr lang="en-US" dirty="0" err="1" smtClean="0"/>
+              <a:t>SpinWait</a:t>
+            </a:r>
+            <a:r>
+              <a:rPr lang="en-US" dirty="0" smtClean="0"/>
+              <a:t> – Busy-wait instead of yielding a processor time-slice to another thread.</a:t>
+            </a:r>
+          </a:p>
+          <a:p>
+            <a:pPr lvl="1"/>
             <a:endParaRPr lang="en-US" dirty="0" smtClean="0"/>
           </a:p>
           <a:p>
-            <a:endParaRPr lang="en-US" dirty="0"/>
+            <a:r>
+              <a:rPr lang="en-US" dirty="0" smtClean="0"/>
+              <a:t>There are lots more, but these are the most common.</a:t>
+            </a:r>
+          </a:p>
+          <a:p>
+            <a:pPr lvl="1"/>
+            <a:endParaRPr lang="en-US" dirty="0" smtClean="0"/>
           </a:p>
         </p:txBody>
       </p:sp>
@@ -3107,6 +3092,135 @@
               <a:rPr lang="en-US" smtClean="0"/>
               <a:pPr/>
               <a:t>11</a:t>
+            </a:fld>
+            <a:endParaRPr lang="en-US"/>
+          </a:p>
+        </p:txBody>
+      </p:sp>
+    </p:spTree>
+    <p:extLst>
+      <p:ext uri="{BB962C8B-B14F-4D97-AF65-F5344CB8AC3E}">
+        <p14:creationId xmlns:p14="http://schemas.microsoft.com/office/powerpoint/2010/main" val="1343707259"/>
+      </p:ext>
+    </p:extLst>
+  </p:cSld>
+  <p:clrMapOvr>
+    <a:masterClrMapping/>
+  </p:clrMapOvr>
+  <p:timing>
+    <p:tnLst>
+      <p:par>
+        <p:cTn id="1" dur="indefinite" restart="never" nodeType="tmRoot"/>
+      </p:par>
+    </p:tnLst>
+  </p:timing>
+</p:sld>
+</file>
+
+<file path=ppt/slides/slide12.xml><?xml version="1.0" encoding="utf-8"?>
+<p:sld xmlns:a="http://schemas.openxmlformats.org/drawingml/2006/main" xmlns:r="http://schemas.openxmlformats.org/officeDocument/2006/relationships" xmlns:p="http://schemas.openxmlformats.org/presentationml/2006/main">
+  <p:cSld>
+    <p:spTree>
+      <p:nvGrpSpPr>
+        <p:cNvPr id="1" name=""/>
+        <p:cNvGrpSpPr/>
+        <p:nvPr/>
+      </p:nvGrpSpPr>
+      <p:grpSpPr>
+        <a:xfrm>
+          <a:off x="0" y="0"/>
+          <a:ext cx="0" cy="0"/>
+          <a:chOff x="0" y="0"/>
+          <a:chExt cx="0" cy="0"/>
+        </a:xfrm>
+      </p:grpSpPr>
+      <p:sp>
+        <p:nvSpPr>
+          <p:cNvPr id="2" name="Title 1"/>
+          <p:cNvSpPr>
+            <a:spLocks noGrp="1"/>
+          </p:cNvSpPr>
+          <p:nvPr>
+            <p:ph type="title"/>
+          </p:nvPr>
+        </p:nvSpPr>
+        <p:spPr/>
+        <p:txBody>
+          <a:bodyPr/>
+          <a:lstStyle/>
+          <a:p>
+            <a:r>
+              <a:rPr lang="en-US" dirty="0" smtClean="0"/>
+              <a:t>Demo #3: SPEEEEEEEED</a:t>
+            </a:r>
+            <a:endParaRPr lang="en-US" dirty="0"/>
+          </a:p>
+        </p:txBody>
+      </p:sp>
+      <p:sp>
+        <p:nvSpPr>
+          <p:cNvPr id="3" name="Content Placeholder 2"/>
+          <p:cNvSpPr>
+            <a:spLocks noGrp="1"/>
+          </p:cNvSpPr>
+          <p:nvPr>
+            <p:ph idx="1"/>
+          </p:nvPr>
+        </p:nvSpPr>
+        <p:spPr/>
+        <p:txBody>
+          <a:bodyPr/>
+          <a:lstStyle/>
+          <a:p>
+            <a:endParaRPr lang="en-US" dirty="0" smtClean="0"/>
+          </a:p>
+          <a:p>
+            <a:endParaRPr lang="en-US" dirty="0"/>
+          </a:p>
+          <a:p>
+            <a:r>
+              <a:rPr lang="en-US" dirty="0" smtClean="0"/>
+              <a:t>Hopefully this demo doesn’t break. I threw it together in two days and I may have been trying to hit the </a:t>
+            </a:r>
+            <a:r>
+              <a:rPr lang="en-US" dirty="0" smtClean="0"/>
+              <a:t>B</a:t>
+            </a:r>
+            <a:r>
+              <a:rPr lang="en-US" dirty="0" smtClean="0"/>
+              <a:t>allmer peak during most of it.</a:t>
+            </a:r>
+          </a:p>
+          <a:p>
+            <a:endParaRPr lang="en-US" dirty="0"/>
+          </a:p>
+          <a:p>
+            <a:endParaRPr lang="en-US" dirty="0" smtClean="0"/>
+          </a:p>
+          <a:p>
+            <a:endParaRPr lang="en-US" dirty="0"/>
+          </a:p>
+        </p:txBody>
+      </p:sp>
+      <p:sp>
+        <p:nvSpPr>
+          <p:cNvPr id="4" name="Slide Number Placeholder 3"/>
+          <p:cNvSpPr>
+            <a:spLocks noGrp="1"/>
+          </p:cNvSpPr>
+          <p:nvPr>
+            <p:ph type="sldNum" sz="quarter" idx="12"/>
+          </p:nvPr>
+        </p:nvSpPr>
+        <p:spPr/>
+        <p:txBody>
+          <a:bodyPr/>
+          <a:lstStyle/>
+          <a:p>
+            <a:fld id="{FCCE2D2B-FBD0-49C3-932E-69727B9D4F2A}" type="slidenum">
+              <a:rPr lang="en-US" smtClean="0"/>
+              <a:pPr/>
+              <a:t>12</a:t>
             </a:fld>
             <a:endParaRPr lang="en-US"/>
           </a:p>
@@ -3282,7 +3396,7 @@
 </p:sld>
 </file>
 
-<file path=ppt/slides/slide12.xml><?xml version="1.0" encoding="utf-8"?>
+<file path=ppt/slides/slide13.xml><?xml version="1.0" encoding="utf-8"?>
 <p:sld xmlns:a="http://schemas.openxmlformats.org/drawingml/2006/main" xmlns:r="http://schemas.openxmlformats.org/officeDocument/2006/relationships" xmlns:p="http://schemas.openxmlformats.org/presentationml/2006/main">
   <p:cSld>
     <p:spTree>

</xml_diff>